<commit_message>
Bayes Posterior Error Analysis
</commit_message>
<xml_diff>
--- a/simulation results.pptx
+++ b/simulation results.pptx
@@ -6,6 +6,8 @@
   </p:sldMasterIdLst>
   <p:sldIdLst>
     <p:sldId id="256" r:id="rId2"/>
+    <p:sldId id="257" r:id="rId3"/>
+    <p:sldId id="258" r:id="rId4"/>
   </p:sldIdLst>
   <p:sldSz cx="12192000" cy="6858000"/>
   <p:notesSz cx="6858000" cy="9144000"/>
@@ -104,6 +106,11 @@
       </a:defRPr>
     </a:lvl9pPr>
   </p:defaultTextStyle>
+  <p:extLst>
+    <p:ext uri="{EFAFB233-063F-42B5-8137-9DF3F51BA10A}">
+      <p15:sldGuideLst xmlns:p15="http://schemas.microsoft.com/office/powerpoint/2012/main"/>
+    </p:ext>
+  </p:extLst>
 </p:presentation>
 </file>
 
@@ -254,7 +261,7 @@
           <a:p>
             <a:fld id="{8A4BA4C5-210C-0C41-B98F-FFBFFFEF34D8}" type="datetimeFigureOut">
               <a:rPr lang="en-US" smtClean="0"/>
-              <a:t>3/23/22</a:t>
+              <a:t>3/26/22</a:t>
             </a:fld>
             <a:endParaRPr lang="en-US"/>
           </a:p>
@@ -452,7 +459,7 @@
           <a:p>
             <a:fld id="{8A4BA4C5-210C-0C41-B98F-FFBFFFEF34D8}" type="datetimeFigureOut">
               <a:rPr lang="en-US" smtClean="0"/>
-              <a:t>3/23/22</a:t>
+              <a:t>3/26/22</a:t>
             </a:fld>
             <a:endParaRPr lang="en-US"/>
           </a:p>
@@ -660,7 +667,7 @@
           <a:p>
             <a:fld id="{8A4BA4C5-210C-0C41-B98F-FFBFFFEF34D8}" type="datetimeFigureOut">
               <a:rPr lang="en-US" smtClean="0"/>
-              <a:t>3/23/22</a:t>
+              <a:t>3/26/22</a:t>
             </a:fld>
             <a:endParaRPr lang="en-US"/>
           </a:p>
@@ -858,7 +865,7 @@
           <a:p>
             <a:fld id="{8A4BA4C5-210C-0C41-B98F-FFBFFFEF34D8}" type="datetimeFigureOut">
               <a:rPr lang="en-US" smtClean="0"/>
-              <a:t>3/23/22</a:t>
+              <a:t>3/26/22</a:t>
             </a:fld>
             <a:endParaRPr lang="en-US"/>
           </a:p>
@@ -1133,7 +1140,7 @@
           <a:p>
             <a:fld id="{8A4BA4C5-210C-0C41-B98F-FFBFFFEF34D8}" type="datetimeFigureOut">
               <a:rPr lang="en-US" smtClean="0"/>
-              <a:t>3/23/22</a:t>
+              <a:t>3/26/22</a:t>
             </a:fld>
             <a:endParaRPr lang="en-US"/>
           </a:p>
@@ -1398,7 +1405,7 @@
           <a:p>
             <a:fld id="{8A4BA4C5-210C-0C41-B98F-FFBFFFEF34D8}" type="datetimeFigureOut">
               <a:rPr lang="en-US" smtClean="0"/>
-              <a:t>3/23/22</a:t>
+              <a:t>3/26/22</a:t>
             </a:fld>
             <a:endParaRPr lang="en-US"/>
           </a:p>
@@ -1810,7 +1817,7 @@
           <a:p>
             <a:fld id="{8A4BA4C5-210C-0C41-B98F-FFBFFFEF34D8}" type="datetimeFigureOut">
               <a:rPr lang="en-US" smtClean="0"/>
-              <a:t>3/23/22</a:t>
+              <a:t>3/26/22</a:t>
             </a:fld>
             <a:endParaRPr lang="en-US"/>
           </a:p>
@@ -1951,7 +1958,7 @@
           <a:p>
             <a:fld id="{8A4BA4C5-210C-0C41-B98F-FFBFFFEF34D8}" type="datetimeFigureOut">
               <a:rPr lang="en-US" smtClean="0"/>
-              <a:t>3/23/22</a:t>
+              <a:t>3/26/22</a:t>
             </a:fld>
             <a:endParaRPr lang="en-US"/>
           </a:p>
@@ -2064,7 +2071,7 @@
           <a:p>
             <a:fld id="{8A4BA4C5-210C-0C41-B98F-FFBFFFEF34D8}" type="datetimeFigureOut">
               <a:rPr lang="en-US" smtClean="0"/>
-              <a:t>3/23/22</a:t>
+              <a:t>3/26/22</a:t>
             </a:fld>
             <a:endParaRPr lang="en-US"/>
           </a:p>
@@ -2375,7 +2382,7 @@
           <a:p>
             <a:fld id="{8A4BA4C5-210C-0C41-B98F-FFBFFFEF34D8}" type="datetimeFigureOut">
               <a:rPr lang="en-US" smtClean="0"/>
-              <a:t>3/23/22</a:t>
+              <a:t>3/26/22</a:t>
             </a:fld>
             <a:endParaRPr lang="en-US"/>
           </a:p>
@@ -2663,7 +2670,7 @@
           <a:p>
             <a:fld id="{8A4BA4C5-210C-0C41-B98F-FFBFFFEF34D8}" type="datetimeFigureOut">
               <a:rPr lang="en-US" smtClean="0"/>
-              <a:t>3/23/22</a:t>
+              <a:t>3/26/22</a:t>
             </a:fld>
             <a:endParaRPr lang="en-US"/>
           </a:p>
@@ -2904,7 +2911,7 @@
           <a:p>
             <a:fld id="{8A4BA4C5-210C-0C41-B98F-FFBFFFEF34D8}" type="datetimeFigureOut">
               <a:rPr lang="en-US" smtClean="0"/>
-              <a:t>3/23/22</a:t>
+              <a:t>3/26/22</a:t>
             </a:fld>
             <a:endParaRPr lang="en-US"/>
           </a:p>
@@ -3429,6 +3436,226 @@
 </p:sld>
 </file>
 
+<file path=ppt/slides/slide2.xml><?xml version="1.0" encoding="utf-8"?>
+<p:sld xmlns:a="http://schemas.openxmlformats.org/drawingml/2006/main" xmlns:r="http://schemas.openxmlformats.org/officeDocument/2006/relationships" xmlns:p="http://schemas.openxmlformats.org/presentationml/2006/main">
+  <p:cSld>
+    <p:spTree>
+      <p:nvGrpSpPr>
+        <p:cNvPr id="1" name=""/>
+        <p:cNvGrpSpPr/>
+        <p:nvPr/>
+      </p:nvGrpSpPr>
+      <p:grpSpPr>
+        <a:xfrm>
+          <a:off x="0" y="0"/>
+          <a:ext cx="0" cy="0"/>
+          <a:chOff x="0" y="0"/>
+          <a:chExt cx="0" cy="0"/>
+        </a:xfrm>
+      </p:grpSpPr>
+      <p:pic>
+        <p:nvPicPr>
+          <p:cNvPr id="5" name="Content Placeholder 4" descr="Background pattern&#10;&#10;Description automatically generated">
+            <a:extLst>
+              <a:ext uri="{FF2B5EF4-FFF2-40B4-BE49-F238E27FC236}">
+                <a16:creationId xmlns:a16="http://schemas.microsoft.com/office/drawing/2014/main" id="{83FEDB3B-2CA2-664B-A679-6B6347965628}"/>
+              </a:ext>
+            </a:extLst>
+          </p:cNvPr>
+          <p:cNvPicPr>
+            <a:picLocks noGrp="1" noChangeAspect="1"/>
+          </p:cNvPicPr>
+          <p:nvPr>
+            <p:ph idx="1"/>
+          </p:nvPr>
+        </p:nvPicPr>
+        <p:blipFill>
+          <a:blip r:embed="rId2"/>
+          <a:stretch>
+            <a:fillRect/>
+          </a:stretch>
+        </p:blipFill>
+        <p:spPr>
+          <a:xfrm>
+            <a:off x="134142" y="182562"/>
+            <a:ext cx="6492875" cy="6492875"/>
+          </a:xfrm>
+        </p:spPr>
+      </p:pic>
+      <p:pic>
+        <p:nvPicPr>
+          <p:cNvPr id="7" name="Picture 6" descr="Text&#10;&#10;Description automatically generated">
+            <a:extLst>
+              <a:ext uri="{FF2B5EF4-FFF2-40B4-BE49-F238E27FC236}">
+                <a16:creationId xmlns:a16="http://schemas.microsoft.com/office/drawing/2014/main" id="{A0BFC087-4112-C54F-BB4F-E0B70F5A8C78}"/>
+              </a:ext>
+            </a:extLst>
+          </p:cNvPr>
+          <p:cNvPicPr>
+            <a:picLocks noChangeAspect="1"/>
+          </p:cNvPicPr>
+          <p:nvPr/>
+        </p:nvPicPr>
+        <p:blipFill>
+          <a:blip r:embed="rId3"/>
+          <a:stretch>
+            <a:fillRect/>
+          </a:stretch>
+        </p:blipFill>
+        <p:spPr>
+          <a:xfrm>
+            <a:off x="6457157" y="1690687"/>
+            <a:ext cx="5736431" cy="3824287"/>
+          </a:xfrm>
+          <a:prstGeom prst="rect">
+            <a:avLst/>
+          </a:prstGeom>
+        </p:spPr>
+      </p:pic>
+    </p:spTree>
+    <p:extLst>
+      <p:ext uri="{BB962C8B-B14F-4D97-AF65-F5344CB8AC3E}">
+        <p14:creationId xmlns:p14="http://schemas.microsoft.com/office/powerpoint/2010/main" val="3691460745"/>
+      </p:ext>
+    </p:extLst>
+  </p:cSld>
+  <p:clrMapOvr>
+    <a:masterClrMapping/>
+  </p:clrMapOvr>
+</p:sld>
+</file>
+
+<file path=ppt/slides/slide3.xml><?xml version="1.0" encoding="utf-8"?>
+<p:sld xmlns:a="http://schemas.openxmlformats.org/drawingml/2006/main" xmlns:r="http://schemas.openxmlformats.org/officeDocument/2006/relationships" xmlns:p="http://schemas.openxmlformats.org/presentationml/2006/main">
+  <p:cSld>
+    <p:spTree>
+      <p:nvGrpSpPr>
+        <p:cNvPr id="1" name=""/>
+        <p:cNvGrpSpPr/>
+        <p:nvPr/>
+      </p:nvGrpSpPr>
+      <p:grpSpPr>
+        <a:xfrm>
+          <a:off x="0" y="0"/>
+          <a:ext cx="0" cy="0"/>
+          <a:chOff x="0" y="0"/>
+          <a:chExt cx="0" cy="0"/>
+        </a:xfrm>
+      </p:grpSpPr>
+      <p:sp>
+        <p:nvSpPr>
+          <p:cNvPr id="2" name="Title 1">
+            <a:extLst>
+              <a:ext uri="{FF2B5EF4-FFF2-40B4-BE49-F238E27FC236}">
+                <a16:creationId xmlns:a16="http://schemas.microsoft.com/office/drawing/2014/main" id="{EA2619A4-CAE0-7D40-A207-E429A096C193}"/>
+              </a:ext>
+            </a:extLst>
+          </p:cNvPr>
+          <p:cNvSpPr>
+            <a:spLocks noGrp="1"/>
+          </p:cNvSpPr>
+          <p:nvPr>
+            <p:ph type="title"/>
+          </p:nvPr>
+        </p:nvSpPr>
+        <p:spPr/>
+        <p:txBody>
+          <a:bodyPr>
+            <a:normAutofit/>
+          </a:bodyPr>
+          <a:lstStyle/>
+          <a:p>
+            <a:r>
+              <a:rPr lang="en-US" dirty="0"/>
+              <a:t>Careful error analysis (Bayesian</a:t>
+            </a:r>
+            <a:r>
+              <a:rPr lang="zh-CN" altLang="en-US" dirty="0"/>
+              <a:t> </a:t>
+            </a:r>
+            <a:r>
+              <a:rPr lang="en-US" altLang="zh-CN" dirty="0"/>
+              <a:t>Posterior</a:t>
+            </a:r>
+            <a:r>
+              <a:rPr lang="en-US" dirty="0"/>
+              <a:t>)</a:t>
+            </a:r>
+          </a:p>
+        </p:txBody>
+      </p:sp>
+      <p:pic>
+        <p:nvPicPr>
+          <p:cNvPr id="5" name="Content Placeholder 4">
+            <a:extLst>
+              <a:ext uri="{FF2B5EF4-FFF2-40B4-BE49-F238E27FC236}">
+                <a16:creationId xmlns:a16="http://schemas.microsoft.com/office/drawing/2014/main" id="{218C317C-57B3-A74E-B67B-F6A249575CC1}"/>
+              </a:ext>
+            </a:extLst>
+          </p:cNvPr>
+          <p:cNvPicPr>
+            <a:picLocks noGrp="1" noChangeAspect="1"/>
+          </p:cNvPicPr>
+          <p:nvPr>
+            <p:ph idx="1"/>
+          </p:nvPr>
+        </p:nvPicPr>
+        <p:blipFill>
+          <a:blip r:embed="rId2"/>
+          <a:stretch>
+            <a:fillRect/>
+          </a:stretch>
+        </p:blipFill>
+        <p:spPr>
+          <a:xfrm>
+            <a:off x="447786" y="1301861"/>
+            <a:ext cx="5654109" cy="5654109"/>
+          </a:xfrm>
+        </p:spPr>
+      </p:pic>
+      <p:pic>
+        <p:nvPicPr>
+          <p:cNvPr id="7" name="Picture 6">
+            <a:extLst>
+              <a:ext uri="{FF2B5EF4-FFF2-40B4-BE49-F238E27FC236}">
+                <a16:creationId xmlns:a16="http://schemas.microsoft.com/office/drawing/2014/main" id="{470AE176-4AC5-DD4E-83E6-10D8C568021A}"/>
+              </a:ext>
+            </a:extLst>
+          </p:cNvPr>
+          <p:cNvPicPr>
+            <a:picLocks noChangeAspect="1"/>
+          </p:cNvPicPr>
+          <p:nvPr/>
+        </p:nvPicPr>
+        <p:blipFill>
+          <a:blip r:embed="rId3"/>
+          <a:stretch>
+            <a:fillRect/>
+          </a:stretch>
+        </p:blipFill>
+        <p:spPr>
+          <a:xfrm>
+            <a:off x="6257814" y="1690688"/>
+            <a:ext cx="5486400" cy="3657600"/>
+          </a:xfrm>
+          <a:prstGeom prst="rect">
+            <a:avLst/>
+          </a:prstGeom>
+        </p:spPr>
+      </p:pic>
+    </p:spTree>
+    <p:extLst>
+      <p:ext uri="{BB962C8B-B14F-4D97-AF65-F5344CB8AC3E}">
+        <p14:creationId xmlns:p14="http://schemas.microsoft.com/office/powerpoint/2010/main" val="3709032120"/>
+      </p:ext>
+    </p:extLst>
+  </p:cSld>
+  <p:clrMapOvr>
+    <a:masterClrMapping/>
+  </p:clrMapOvr>
+</p:sld>
+</file>
+
 <file path=ppt/theme/theme1.xml><?xml version="1.0" encoding="utf-8"?>
 <a:theme xmlns:a="http://schemas.openxmlformats.org/drawingml/2006/main" name="Office Theme">
   <a:themeElements>

</xml_diff>

<commit_message>
Simulating using run 1 to guide run 2's exploration
</commit_message>
<xml_diff>
--- a/simulation results.pptx
+++ b/simulation results.pptx
@@ -9,6 +9,7 @@
     <p:sldId id="257" r:id="rId3"/>
     <p:sldId id="258" r:id="rId4"/>
     <p:sldId id="260" r:id="rId5"/>
+    <p:sldId id="261" r:id="rId6"/>
   </p:sldIdLst>
   <p:sldSz cx="12192000" cy="6858000"/>
   <p:notesSz cx="6858000" cy="9144000"/>
@@ -262,7 +263,7 @@
           <a:p>
             <a:fld id="{8A4BA4C5-210C-0C41-B98F-FFBFFFEF34D8}" type="datetimeFigureOut">
               <a:rPr lang="en-US" smtClean="0"/>
-              <a:t>3/27/22</a:t>
+              <a:t>4/13/22</a:t>
             </a:fld>
             <a:endParaRPr lang="en-US"/>
           </a:p>
@@ -460,7 +461,7 @@
           <a:p>
             <a:fld id="{8A4BA4C5-210C-0C41-B98F-FFBFFFEF34D8}" type="datetimeFigureOut">
               <a:rPr lang="en-US" smtClean="0"/>
-              <a:t>3/27/22</a:t>
+              <a:t>4/13/22</a:t>
             </a:fld>
             <a:endParaRPr lang="en-US"/>
           </a:p>
@@ -668,7 +669,7 @@
           <a:p>
             <a:fld id="{8A4BA4C5-210C-0C41-B98F-FFBFFFEF34D8}" type="datetimeFigureOut">
               <a:rPr lang="en-US" smtClean="0"/>
-              <a:t>3/27/22</a:t>
+              <a:t>4/13/22</a:t>
             </a:fld>
             <a:endParaRPr lang="en-US"/>
           </a:p>
@@ -866,7 +867,7 @@
           <a:p>
             <a:fld id="{8A4BA4C5-210C-0C41-B98F-FFBFFFEF34D8}" type="datetimeFigureOut">
               <a:rPr lang="en-US" smtClean="0"/>
-              <a:t>3/27/22</a:t>
+              <a:t>4/13/22</a:t>
             </a:fld>
             <a:endParaRPr lang="en-US"/>
           </a:p>
@@ -1141,7 +1142,7 @@
           <a:p>
             <a:fld id="{8A4BA4C5-210C-0C41-B98F-FFBFFFEF34D8}" type="datetimeFigureOut">
               <a:rPr lang="en-US" smtClean="0"/>
-              <a:t>3/27/22</a:t>
+              <a:t>4/13/22</a:t>
             </a:fld>
             <a:endParaRPr lang="en-US"/>
           </a:p>
@@ -1406,7 +1407,7 @@
           <a:p>
             <a:fld id="{8A4BA4C5-210C-0C41-B98F-FFBFFFEF34D8}" type="datetimeFigureOut">
               <a:rPr lang="en-US" smtClean="0"/>
-              <a:t>3/27/22</a:t>
+              <a:t>4/13/22</a:t>
             </a:fld>
             <a:endParaRPr lang="en-US"/>
           </a:p>
@@ -1818,7 +1819,7 @@
           <a:p>
             <a:fld id="{8A4BA4C5-210C-0C41-B98F-FFBFFFEF34D8}" type="datetimeFigureOut">
               <a:rPr lang="en-US" smtClean="0"/>
-              <a:t>3/27/22</a:t>
+              <a:t>4/13/22</a:t>
             </a:fld>
             <a:endParaRPr lang="en-US"/>
           </a:p>
@@ -1959,7 +1960,7 @@
           <a:p>
             <a:fld id="{8A4BA4C5-210C-0C41-B98F-FFBFFFEF34D8}" type="datetimeFigureOut">
               <a:rPr lang="en-US" smtClean="0"/>
-              <a:t>3/27/22</a:t>
+              <a:t>4/13/22</a:t>
             </a:fld>
             <a:endParaRPr lang="en-US"/>
           </a:p>
@@ -2072,7 +2073,7 @@
           <a:p>
             <a:fld id="{8A4BA4C5-210C-0C41-B98F-FFBFFFEF34D8}" type="datetimeFigureOut">
               <a:rPr lang="en-US" smtClean="0"/>
-              <a:t>3/27/22</a:t>
+              <a:t>4/13/22</a:t>
             </a:fld>
             <a:endParaRPr lang="en-US"/>
           </a:p>
@@ -2383,7 +2384,7 @@
           <a:p>
             <a:fld id="{8A4BA4C5-210C-0C41-B98F-FFBFFFEF34D8}" type="datetimeFigureOut">
               <a:rPr lang="en-US" smtClean="0"/>
-              <a:t>3/27/22</a:t>
+              <a:t>4/13/22</a:t>
             </a:fld>
             <a:endParaRPr lang="en-US"/>
           </a:p>
@@ -2671,7 +2672,7 @@
           <a:p>
             <a:fld id="{8A4BA4C5-210C-0C41-B98F-FFBFFFEF34D8}" type="datetimeFigureOut">
               <a:rPr lang="en-US" smtClean="0"/>
-              <a:t>3/27/22</a:t>
+              <a:t>4/13/22</a:t>
             </a:fld>
             <a:endParaRPr lang="en-US"/>
           </a:p>
@@ -2912,7 +2913,7 @@
           <a:p>
             <a:fld id="{8A4BA4C5-210C-0C41-B98F-FFBFFFEF34D8}" type="datetimeFigureOut">
               <a:rPr lang="en-US" smtClean="0"/>
-              <a:t>3/27/22</a:t>
+              <a:t>4/13/22</a:t>
             </a:fld>
             <a:endParaRPr lang="en-US"/>
           </a:p>
@@ -3780,6 +3781,352 @@
 </p:sld>
 </file>
 
+<file path=ppt/slides/slide5.xml><?xml version="1.0" encoding="utf-8"?>
+<p:sld xmlns:a="http://schemas.openxmlformats.org/drawingml/2006/main" xmlns:r="http://schemas.openxmlformats.org/officeDocument/2006/relationships" xmlns:p="http://schemas.openxmlformats.org/presentationml/2006/main">
+  <p:cSld>
+    <p:spTree>
+      <p:nvGrpSpPr>
+        <p:cNvPr id="1" name=""/>
+        <p:cNvGrpSpPr/>
+        <p:nvPr/>
+      </p:nvGrpSpPr>
+      <p:grpSpPr>
+        <a:xfrm>
+          <a:off x="0" y="0"/>
+          <a:ext cx="0" cy="0"/>
+          <a:chOff x="0" y="0"/>
+          <a:chExt cx="0" cy="0"/>
+        </a:xfrm>
+      </p:grpSpPr>
+      <p:sp>
+        <p:nvSpPr>
+          <p:cNvPr id="2" name="Title 1">
+            <a:extLst>
+              <a:ext uri="{FF2B5EF4-FFF2-40B4-BE49-F238E27FC236}">
+                <a16:creationId xmlns:a16="http://schemas.microsoft.com/office/drawing/2014/main" id="{C3B72F7A-E7D4-41C8-C777-D157DD4240D6}"/>
+              </a:ext>
+            </a:extLst>
+          </p:cNvPr>
+          <p:cNvSpPr>
+            <a:spLocks noGrp="1"/>
+          </p:cNvSpPr>
+          <p:nvPr>
+            <p:ph type="title"/>
+          </p:nvPr>
+        </p:nvSpPr>
+        <p:spPr>
+          <a:xfrm>
+            <a:off x="402771" y="365125"/>
+            <a:ext cx="11789229" cy="1325563"/>
+          </a:xfrm>
+        </p:spPr>
+        <p:txBody>
+          <a:bodyPr/>
+          <a:lstStyle/>
+          <a:p>
+            <a:r>
+              <a:rPr lang="en-US" dirty="0"/>
+              <a:t>Guided Exploration (Using 1</a:t>
+            </a:r>
+            <a:r>
+              <a:rPr lang="en-US" baseline="30000" dirty="0"/>
+              <a:t>st</a:t>
+            </a:r>
+            <a:r>
+              <a:rPr lang="en-US" dirty="0"/>
+              <a:t> run </a:t>
+            </a:r>
+            <a:r>
+              <a:rPr lang="en-US" dirty="0" err="1"/>
+              <a:t>optm</a:t>
+            </a:r>
+            <a:r>
+              <a:rPr lang="en-US" dirty="0"/>
+              <a:t> on 2</a:t>
+            </a:r>
+            <a:r>
+              <a:rPr lang="en-US" baseline="30000" dirty="0"/>
+              <a:t>nd</a:t>
+            </a:r>
+            <a:r>
+              <a:rPr lang="en-US" dirty="0"/>
+              <a:t> run)</a:t>
+            </a:r>
+          </a:p>
+        </p:txBody>
+      </p:sp>
+      <p:pic>
+        <p:nvPicPr>
+          <p:cNvPr id="5" name="Content Placeholder 4" descr="Chart, histogram&#10;&#10;Description automatically generated">
+            <a:extLst>
+              <a:ext uri="{FF2B5EF4-FFF2-40B4-BE49-F238E27FC236}">
+                <a16:creationId xmlns:a16="http://schemas.microsoft.com/office/drawing/2014/main" id="{AE154E62-FCCC-8789-0058-83ABE284D0DE}"/>
+              </a:ext>
+            </a:extLst>
+          </p:cNvPr>
+          <p:cNvPicPr>
+            <a:picLocks noGrp="1" noChangeAspect="1"/>
+          </p:cNvPicPr>
+          <p:nvPr>
+            <p:ph idx="1"/>
+          </p:nvPr>
+        </p:nvPicPr>
+        <p:blipFill>
+          <a:blip r:embed="rId2"/>
+          <a:stretch>
+            <a:fillRect/>
+          </a:stretch>
+        </p:blipFill>
+        <p:spPr>
+          <a:xfrm>
+            <a:off x="3738561" y="1181100"/>
+            <a:ext cx="4714877" cy="3143251"/>
+          </a:xfrm>
+        </p:spPr>
+      </p:pic>
+      <p:pic>
+        <p:nvPicPr>
+          <p:cNvPr id="7" name="Picture 6" descr="Chart, histogram&#10;&#10;Description automatically generated">
+            <a:extLst>
+              <a:ext uri="{FF2B5EF4-FFF2-40B4-BE49-F238E27FC236}">
+                <a16:creationId xmlns:a16="http://schemas.microsoft.com/office/drawing/2014/main" id="{350A1099-69A6-8A08-AD21-7F823B3F05D2}"/>
+              </a:ext>
+            </a:extLst>
+          </p:cNvPr>
+          <p:cNvPicPr>
+            <a:picLocks noChangeAspect="1"/>
+          </p:cNvPicPr>
+          <p:nvPr/>
+        </p:nvPicPr>
+        <p:blipFill>
+          <a:blip r:embed="rId3"/>
+          <a:stretch>
+            <a:fillRect/>
+          </a:stretch>
+        </p:blipFill>
+        <p:spPr>
+          <a:xfrm>
+            <a:off x="-214312" y="1181100"/>
+            <a:ext cx="4714877" cy="3143251"/>
+          </a:xfrm>
+          <a:prstGeom prst="rect">
+            <a:avLst/>
+          </a:prstGeom>
+        </p:spPr>
+      </p:pic>
+      <p:pic>
+        <p:nvPicPr>
+          <p:cNvPr id="9" name="Picture 8" descr="Chart, histogram&#10;&#10;Description automatically generated">
+            <a:extLst>
+              <a:ext uri="{FF2B5EF4-FFF2-40B4-BE49-F238E27FC236}">
+                <a16:creationId xmlns:a16="http://schemas.microsoft.com/office/drawing/2014/main" id="{2796EA8F-8A5A-5157-9641-62CAC30C2704}"/>
+              </a:ext>
+            </a:extLst>
+          </p:cNvPr>
+          <p:cNvPicPr>
+            <a:picLocks noChangeAspect="1"/>
+          </p:cNvPicPr>
+          <p:nvPr/>
+        </p:nvPicPr>
+        <p:blipFill>
+          <a:blip r:embed="rId4"/>
+          <a:stretch>
+            <a:fillRect/>
+          </a:stretch>
+        </p:blipFill>
+        <p:spPr>
+          <a:xfrm>
+            <a:off x="7846560" y="1181099"/>
+            <a:ext cx="4714877" cy="3143251"/>
+          </a:xfrm>
+          <a:prstGeom prst="rect">
+            <a:avLst/>
+          </a:prstGeom>
+        </p:spPr>
+      </p:pic>
+      <p:sp>
+        <p:nvSpPr>
+          <p:cNvPr id="10" name="TextBox 9">
+            <a:extLst>
+              <a:ext uri="{FF2B5EF4-FFF2-40B4-BE49-F238E27FC236}">
+                <a16:creationId xmlns:a16="http://schemas.microsoft.com/office/drawing/2014/main" id="{3D2B2443-7FA7-A53D-C020-E2753B07B37B}"/>
+              </a:ext>
+            </a:extLst>
+          </p:cNvPr>
+          <p:cNvSpPr txBox="1"/>
+          <p:nvPr/>
+        </p:nvSpPr>
+        <p:spPr>
+          <a:xfrm>
+            <a:off x="2143126" y="2568058"/>
+            <a:ext cx="476412" cy="369332"/>
+          </a:xfrm>
+          <a:prstGeom prst="rect">
+            <a:avLst/>
+          </a:prstGeom>
+          <a:noFill/>
+        </p:spPr>
+        <p:txBody>
+          <a:bodyPr wrap="none" rtlCol="0">
+            <a:spAutoFit/>
+          </a:bodyPr>
+          <a:lstStyle/>
+          <a:p>
+            <a:r>
+              <a:rPr lang="en-US" dirty="0"/>
+              <a:t>0.3</a:t>
+            </a:r>
+          </a:p>
+        </p:txBody>
+      </p:sp>
+      <p:sp>
+        <p:nvSpPr>
+          <p:cNvPr id="12" name="TextBox 11">
+            <a:extLst>
+              <a:ext uri="{FF2B5EF4-FFF2-40B4-BE49-F238E27FC236}">
+                <a16:creationId xmlns:a16="http://schemas.microsoft.com/office/drawing/2014/main" id="{73F05BCA-DF39-480F-942A-C9B2B60AC6E1}"/>
+              </a:ext>
+            </a:extLst>
+          </p:cNvPr>
+          <p:cNvSpPr txBox="1"/>
+          <p:nvPr/>
+        </p:nvSpPr>
+        <p:spPr>
+          <a:xfrm>
+            <a:off x="6237707" y="2198726"/>
+            <a:ext cx="476412" cy="369332"/>
+          </a:xfrm>
+          <a:prstGeom prst="rect">
+            <a:avLst/>
+          </a:prstGeom>
+          <a:noFill/>
+        </p:spPr>
+        <p:txBody>
+          <a:bodyPr wrap="none" rtlCol="0">
+            <a:spAutoFit/>
+          </a:bodyPr>
+          <a:lstStyle/>
+          <a:p>
+            <a:r>
+              <a:rPr lang="en-US" dirty="0"/>
+              <a:t>0.1</a:t>
+            </a:r>
+          </a:p>
+        </p:txBody>
+      </p:sp>
+      <p:sp>
+        <p:nvSpPr>
+          <p:cNvPr id="13" name="TextBox 12">
+            <a:extLst>
+              <a:ext uri="{FF2B5EF4-FFF2-40B4-BE49-F238E27FC236}">
+                <a16:creationId xmlns:a16="http://schemas.microsoft.com/office/drawing/2014/main" id="{54F21EF7-45E6-8206-0984-2399073AD0FC}"/>
+              </a:ext>
+            </a:extLst>
+          </p:cNvPr>
+          <p:cNvSpPr txBox="1"/>
+          <p:nvPr/>
+        </p:nvSpPr>
+        <p:spPr>
+          <a:xfrm>
+            <a:off x="10525402" y="2321996"/>
+            <a:ext cx="593432" cy="369332"/>
+          </a:xfrm>
+          <a:prstGeom prst="rect">
+            <a:avLst/>
+          </a:prstGeom>
+          <a:noFill/>
+        </p:spPr>
+        <p:txBody>
+          <a:bodyPr wrap="none" rtlCol="0">
+            <a:spAutoFit/>
+          </a:bodyPr>
+          <a:lstStyle/>
+          <a:p>
+            <a:r>
+              <a:rPr lang="en-US" dirty="0"/>
+              <a:t>0.05</a:t>
+            </a:r>
+          </a:p>
+        </p:txBody>
+      </p:sp>
+      <p:pic>
+        <p:nvPicPr>
+          <p:cNvPr id="15" name="Picture 14" descr="Chart, histogram&#10;&#10;Description automatically generated">
+            <a:extLst>
+              <a:ext uri="{FF2B5EF4-FFF2-40B4-BE49-F238E27FC236}">
+                <a16:creationId xmlns:a16="http://schemas.microsoft.com/office/drawing/2014/main" id="{AC87BA17-3D96-3EEB-31C7-68A40B0DBDED}"/>
+              </a:ext>
+            </a:extLst>
+          </p:cNvPr>
+          <p:cNvPicPr>
+            <a:picLocks noChangeAspect="1"/>
+          </p:cNvPicPr>
+          <p:nvPr/>
+        </p:nvPicPr>
+        <p:blipFill>
+          <a:blip r:embed="rId5"/>
+          <a:stretch>
+            <a:fillRect/>
+          </a:stretch>
+        </p:blipFill>
+        <p:spPr>
+          <a:xfrm>
+            <a:off x="-214312" y="3920611"/>
+            <a:ext cx="4714877" cy="3143251"/>
+          </a:xfrm>
+          <a:prstGeom prst="rect">
+            <a:avLst/>
+          </a:prstGeom>
+        </p:spPr>
+      </p:pic>
+      <p:sp>
+        <p:nvSpPr>
+          <p:cNvPr id="16" name="TextBox 15">
+            <a:extLst>
+              <a:ext uri="{FF2B5EF4-FFF2-40B4-BE49-F238E27FC236}">
+                <a16:creationId xmlns:a16="http://schemas.microsoft.com/office/drawing/2014/main" id="{0A4C4B46-A4DC-3154-E46A-E9BB37A2EBCD}"/>
+              </a:ext>
+            </a:extLst>
+          </p:cNvPr>
+          <p:cNvSpPr txBox="1"/>
+          <p:nvPr/>
+        </p:nvSpPr>
+        <p:spPr>
+          <a:xfrm>
+            <a:off x="2084616" y="5106473"/>
+            <a:ext cx="593432" cy="369332"/>
+          </a:xfrm>
+          <a:prstGeom prst="rect">
+            <a:avLst/>
+          </a:prstGeom>
+          <a:noFill/>
+        </p:spPr>
+        <p:txBody>
+          <a:bodyPr wrap="none" rtlCol="0">
+            <a:spAutoFit/>
+          </a:bodyPr>
+          <a:lstStyle/>
+          <a:p>
+            <a:r>
+              <a:rPr lang="en-US" dirty="0"/>
+              <a:t>0.02</a:t>
+            </a:r>
+          </a:p>
+        </p:txBody>
+      </p:sp>
+    </p:spTree>
+    <p:extLst>
+      <p:ext uri="{BB962C8B-B14F-4D97-AF65-F5344CB8AC3E}">
+        <p14:creationId xmlns:p14="http://schemas.microsoft.com/office/powerpoint/2010/main" val="898519118"/>
+      </p:ext>
+    </p:extLst>
+  </p:cSld>
+  <p:clrMapOvr>
+    <a:masterClrMapping/>
+  </p:clrMapOvr>
+</p:sld>
+</file>
+
 <file path=ppt/theme/theme1.xml><?xml version="1.0" encoding="utf-8"?>
 <a:theme xmlns:a="http://schemas.openxmlformats.org/drawingml/2006/main" name="Office Theme">
   <a:themeElements>

</xml_diff>